<commit_message>
Finished W10S1, prepared additional folders for lectures on W10, 11, 12, 13.
</commit_message>
<xml_diff>
--- a/W10/W10S2/W10S2.pptx
+++ b/W10/W10S2/W10S2.pptx
@@ -10483,7 +10483,7 @@
   <pc:docChgLst>
     <pc:chgData name="Matthieu De Mari" userId="dfb708c9-d8dc-439f-9a3b-c772bf4a311c" providerId="ADAL" clId="{A47A6B7A-BB49-46B6-95C9-1A9A2555371D}"/>
     <pc:docChg chg="custSel addSld delSld modSld addSection delSection modSection">
-      <pc:chgData name="Matthieu De Mari" userId="dfb708c9-d8dc-439f-9a3b-c772bf4a311c" providerId="ADAL" clId="{A47A6B7A-BB49-46B6-95C9-1A9A2555371D}" dt="2023-03-22T06:20:12.258" v="251" actId="20577"/>
+      <pc:chgData name="Matthieu De Mari" userId="dfb708c9-d8dc-439f-9a3b-c772bf4a311c" providerId="ADAL" clId="{A47A6B7A-BB49-46B6-95C9-1A9A2555371D}" dt="2023-03-27T07:25:48.801" v="253" actId="20577"/>
       <pc:docMkLst>
         <pc:docMk/>
       </pc:docMkLst>
@@ -10607,13 +10607,13 @@
         </pc:spChg>
       </pc:sldChg>
       <pc:sldChg chg="modSp add mod">
-        <pc:chgData name="Matthieu De Mari" userId="dfb708c9-d8dc-439f-9a3b-c772bf4a311c" providerId="ADAL" clId="{A47A6B7A-BB49-46B6-95C9-1A9A2555371D}" dt="2023-03-22T06:20:12.258" v="251" actId="20577"/>
+        <pc:chgData name="Matthieu De Mari" userId="dfb708c9-d8dc-439f-9a3b-c772bf4a311c" providerId="ADAL" clId="{A47A6B7A-BB49-46B6-95C9-1A9A2555371D}" dt="2023-03-27T07:25:48.801" v="253" actId="20577"/>
         <pc:sldMkLst>
           <pc:docMk/>
           <pc:sldMk cId="173920476" sldId="382"/>
         </pc:sldMkLst>
         <pc:spChg chg="mod">
-          <ac:chgData name="Matthieu De Mari" userId="dfb708c9-d8dc-439f-9a3b-c772bf4a311c" providerId="ADAL" clId="{A47A6B7A-BB49-46B6-95C9-1A9A2555371D}" dt="2023-03-22T06:20:12.258" v="251" actId="20577"/>
+          <ac:chgData name="Matthieu De Mari" userId="dfb708c9-d8dc-439f-9a3b-c772bf4a311c" providerId="ADAL" clId="{A47A6B7A-BB49-46B6-95C9-1A9A2555371D}" dt="2023-03-27T07:25:48.801" v="253" actId="20577"/>
           <ac:spMkLst>
             <pc:docMk/>
             <pc:sldMk cId="173920476" sldId="382"/>
@@ -13179,7 +13179,7 @@
           <a:p>
             <a:fld id="{98CFC6A4-B085-437B-8084-693BEB2A32DE}" type="datetimeFigureOut">
               <a:rPr lang="en-SG" smtClean="0"/>
-              <a:t>22/3/2023</a:t>
+              <a:t>27/3/2023</a:t>
             </a:fld>
             <a:endParaRPr lang="en-SG"/>
           </a:p>
@@ -13596,7 +13596,7 @@
           <a:p>
             <a:fld id="{AB35F6B0-D468-4997-9CE3-CF2A1AE5E3F9}" type="datetimeFigureOut">
               <a:rPr lang="en-SG" smtClean="0"/>
-              <a:t>22/3/2023</a:t>
+              <a:t>27/3/2023</a:t>
             </a:fld>
             <a:endParaRPr lang="en-SG"/>
           </a:p>
@@ -13796,7 +13796,7 @@
           <a:p>
             <a:fld id="{AB35F6B0-D468-4997-9CE3-CF2A1AE5E3F9}" type="datetimeFigureOut">
               <a:rPr lang="en-SG" smtClean="0"/>
-              <a:t>22/3/2023</a:t>
+              <a:t>27/3/2023</a:t>
             </a:fld>
             <a:endParaRPr lang="en-SG"/>
           </a:p>
@@ -14006,7 +14006,7 @@
           <a:p>
             <a:fld id="{AB35F6B0-D468-4997-9CE3-CF2A1AE5E3F9}" type="datetimeFigureOut">
               <a:rPr lang="en-SG" smtClean="0"/>
-              <a:t>22/3/2023</a:t>
+              <a:t>27/3/2023</a:t>
             </a:fld>
             <a:endParaRPr lang="en-SG"/>
           </a:p>
@@ -14206,7 +14206,7 @@
           <a:p>
             <a:fld id="{AB35F6B0-D468-4997-9CE3-CF2A1AE5E3F9}" type="datetimeFigureOut">
               <a:rPr lang="en-SG" smtClean="0"/>
-              <a:t>22/3/2023</a:t>
+              <a:t>27/3/2023</a:t>
             </a:fld>
             <a:endParaRPr lang="en-SG"/>
           </a:p>
@@ -14482,7 +14482,7 @@
           <a:p>
             <a:fld id="{AB35F6B0-D468-4997-9CE3-CF2A1AE5E3F9}" type="datetimeFigureOut">
               <a:rPr lang="en-SG" smtClean="0"/>
-              <a:t>22/3/2023</a:t>
+              <a:t>27/3/2023</a:t>
             </a:fld>
             <a:endParaRPr lang="en-SG"/>
           </a:p>
@@ -14750,7 +14750,7 @@
           <a:p>
             <a:fld id="{AB35F6B0-D468-4997-9CE3-CF2A1AE5E3F9}" type="datetimeFigureOut">
               <a:rPr lang="en-SG" smtClean="0"/>
-              <a:t>22/3/2023</a:t>
+              <a:t>27/3/2023</a:t>
             </a:fld>
             <a:endParaRPr lang="en-SG"/>
           </a:p>
@@ -15165,7 +15165,7 @@
           <a:p>
             <a:fld id="{AB35F6B0-D468-4997-9CE3-CF2A1AE5E3F9}" type="datetimeFigureOut">
               <a:rPr lang="en-SG" smtClean="0"/>
-              <a:t>22/3/2023</a:t>
+              <a:t>27/3/2023</a:t>
             </a:fld>
             <a:endParaRPr lang="en-SG"/>
           </a:p>
@@ -15307,7 +15307,7 @@
           <a:p>
             <a:fld id="{AB35F6B0-D468-4997-9CE3-CF2A1AE5E3F9}" type="datetimeFigureOut">
               <a:rPr lang="en-SG" smtClean="0"/>
-              <a:t>22/3/2023</a:t>
+              <a:t>27/3/2023</a:t>
             </a:fld>
             <a:endParaRPr lang="en-SG"/>
           </a:p>
@@ -15420,7 +15420,7 @@
           <a:p>
             <a:fld id="{AB35F6B0-D468-4997-9CE3-CF2A1AE5E3F9}" type="datetimeFigureOut">
               <a:rPr lang="en-SG" smtClean="0"/>
-              <a:t>22/3/2023</a:t>
+              <a:t>27/3/2023</a:t>
             </a:fld>
             <a:endParaRPr lang="en-SG"/>
           </a:p>
@@ -15733,7 +15733,7 @@
           <a:p>
             <a:fld id="{AB35F6B0-D468-4997-9CE3-CF2A1AE5E3F9}" type="datetimeFigureOut">
               <a:rPr lang="en-SG" smtClean="0"/>
-              <a:t>22/3/2023</a:t>
+              <a:t>27/3/2023</a:t>
             </a:fld>
             <a:endParaRPr lang="en-SG"/>
           </a:p>
@@ -16022,7 +16022,7 @@
           <a:p>
             <a:fld id="{AB35F6B0-D468-4997-9CE3-CF2A1AE5E3F9}" type="datetimeFigureOut">
               <a:rPr lang="en-SG" smtClean="0"/>
-              <a:t>22/3/2023</a:t>
+              <a:t>27/3/2023</a:t>
             </a:fld>
             <a:endParaRPr lang="en-SG"/>
           </a:p>
@@ -16265,7 +16265,7 @@
           <a:p>
             <a:fld id="{AB35F6B0-D468-4997-9CE3-CF2A1AE5E3F9}" type="datetimeFigureOut">
               <a:rPr lang="en-SG" smtClean="0"/>
-              <a:t>22/3/2023</a:t>
+              <a:t>27/3/2023</a:t>
             </a:fld>
             <a:endParaRPr lang="en-SG"/>
           </a:p>
@@ -17223,11 +17223,7 @@
             </a:br>
             <a:r>
               <a:rPr lang="en-GB" dirty="0"/>
-              <a:t>(Nani the hell is going on here?! </a:t>
-            </a:r>
-            <a:r>
-              <a:rPr lang="en-GB"/>
-              <a:t>Did the prof go mad?!)</a:t>
+              <a:t>(Nani the hell is going on here?!)</a:t>
             </a:r>
             <a:endParaRPr lang="en-SG" dirty="0"/>
           </a:p>

</xml_diff>